<commit_message>
Doku Update: - GUI Kameras - Cursor Kameras - Update ManagementSummary
</commit_message>
<xml_diff>
--- a/docs/Plakat/plakat_a1.pptx
+++ b/docs/Plakat/plakat_a1.pptx
@@ -1637,12 +1637,6 @@
               </a:rPr>
               <a:t>Ergebnis</a:t>
             </a:r>
-            <a:endParaRPr lang="de-CH" altLang="de-DE" sz="4400" dirty="0" smtClean="0">
-              <a:solidFill>
-                <a:srgbClr val="697D91"/>
-              </a:solidFill>
-              <a:latin typeface="+mj-lt"/>
-            </a:endParaRPr>
           </a:p>
           <a:p>
             <a:pPr algn="just">
@@ -1695,7 +1689,19 @@
               <a:rPr lang="de-CH" altLang="de-DE" sz="2400" dirty="0" smtClean="0">
                 <a:latin typeface="Lucida Sans" pitchFamily="34" charset="0"/>
               </a:rPr>
-              <a:t> Anwendungen abdecken zu können, werden etliche Einstellungs-möglichkeiten zu Verfügung gestellt. So können beispielsweise zusätzliche Kameras individuell platziert oder die Darstellung der UI-Elemente auf eine CAVE-Leinwand fixiert werden. Weiter sind die Buttons </a:t>
+              <a:t> Anwendungen abdecken zu können, werden etliche Einstellungs-möglichkeiten zu Verfügung gestellt. So können beispielsweise zusätzliche Kameras individuell platziert oder die Darstellung der </a:t>
+            </a:r>
+            <a:r>
+              <a:rPr lang="de-CH" altLang="de-DE" sz="2400" dirty="0" smtClean="0">
+                <a:latin typeface="Lucida Sans" pitchFamily="34" charset="0"/>
+              </a:rPr>
+              <a:t>GUI-Elemente </a:t>
+            </a:r>
+            <a:r>
+              <a:rPr lang="de-CH" altLang="de-DE" sz="2400" dirty="0" smtClean="0">
+                <a:latin typeface="Lucida Sans" pitchFamily="34" charset="0"/>
+              </a:rPr>
+              <a:t>auf eine CAVE-Leinwand fixiert werden. Weiter sind die Buttons </a:t>
             </a:r>
             <a:r>
               <a:rPr lang="de-CH" altLang="de-DE" sz="2400" dirty="0">
@@ -1713,13 +1719,7 @@
               <a:rPr lang="de-CH" altLang="de-DE" sz="2400" dirty="0" smtClean="0">
                 <a:latin typeface="Lucida Sans" pitchFamily="34" charset="0"/>
               </a:rPr>
-              <a:t> Wand, dem </a:t>
-            </a:r>
-            <a:r>
-              <a:rPr lang="de-CH" altLang="de-DE" sz="2400" dirty="0" smtClean="0">
-                <a:latin typeface="Lucida Sans" pitchFamily="34" charset="0"/>
-              </a:rPr>
-              <a:t>primären Inputgerät, frei zuordenbar, um der eigenen Applikation zu entsprechen. Falls auf Wunsch nur spezifische Achsen bei der Weiterverarbeitung der Devices beachtet werden sollen, können diese auch frei ein- und ausgeschaltet werden.</a:t>
+              <a:t> Wand, dem primären Inputgerät, frei zuordenbar, um der eigenen Applikation zu entsprechen. Falls auf Wunsch nur spezifische Achsen bei der Weiterverarbeitung der Devices beachtet werden sollen, können diese auch frei ein- und ausgeschaltet werden.</a:t>
             </a:r>
           </a:p>
           <a:p>
@@ -1965,7 +1965,7 @@
         <p:spPr>
           <a:xfrm>
             <a:off x="898778" y="937998"/>
-            <a:ext cx="17160623" cy="4955203"/>
+            <a:ext cx="17160623" cy="5324535"/>
           </a:xfrm>
           <a:prstGeom prst="rect">
             <a:avLst/>
@@ -2138,7 +2138,19 @@
               <a:rPr lang="de-CH" altLang="de-DE" sz="2400" dirty="0" smtClean="0">
                 <a:latin typeface="Lucida Sans" pitchFamily="34" charset="0"/>
               </a:rPr>
-              <a:t>Der Hauptbestandteil der Umsetzung war die virtuelle Abbildung der Komponenten. Mit Hilfe von </a:t>
+              <a:t>Der Hauptbestandteil der Umsetzung </a:t>
+            </a:r>
+            <a:r>
+              <a:rPr lang="de-CH" altLang="de-DE" sz="2400" dirty="0" smtClean="0">
+                <a:latin typeface="Lucida Sans" pitchFamily="34" charset="0"/>
+              </a:rPr>
+              <a:t>ist die </a:t>
+            </a:r>
+            <a:r>
+              <a:rPr lang="de-CH" altLang="de-DE" sz="2400" dirty="0" smtClean="0">
+                <a:latin typeface="Lucida Sans" pitchFamily="34" charset="0"/>
+              </a:rPr>
+              <a:t>virtuelle Abbildung der Komponenten. Mit Hilfe von </a:t>
             </a:r>
             <a:r>
               <a:rPr lang="de-CH" altLang="de-DE" sz="2400" dirty="0" err="1" smtClean="0">
@@ -2150,7 +2162,31 @@
               <a:rPr lang="de-CH" altLang="de-DE" sz="2400" dirty="0" smtClean="0">
                 <a:latin typeface="Lucida Sans" pitchFamily="34" charset="0"/>
               </a:rPr>
-              <a:t> wurde die Weiterverarbeitung und Interpretation vereinfacht und ist somit Basis für die Manipulationen der Applikation.</a:t>
+              <a:t> </a:t>
+            </a:r>
+            <a:r>
+              <a:rPr lang="de-CH" altLang="de-DE" sz="2400" dirty="0" smtClean="0">
+                <a:latin typeface="Lucida Sans" pitchFamily="34" charset="0"/>
+              </a:rPr>
+              <a:t>wird die </a:t>
+            </a:r>
+            <a:r>
+              <a:rPr lang="de-CH" altLang="de-DE" sz="2400" dirty="0" smtClean="0">
+                <a:latin typeface="Lucida Sans" pitchFamily="34" charset="0"/>
+              </a:rPr>
+              <a:t>Weiterverarbeitung und Interpretation vereinfacht und ist somit Basis </a:t>
+            </a:r>
+            <a:r>
+              <a:rPr lang="de-CH" altLang="de-DE" sz="2400" dirty="0" smtClean="0">
+                <a:latin typeface="Lucida Sans" pitchFamily="34" charset="0"/>
+              </a:rPr>
+              <a:t>für sämtliche Manipulationen </a:t>
+            </a:r>
+            <a:r>
+              <a:rPr lang="de-CH" altLang="de-DE" sz="2400" dirty="0" smtClean="0">
+                <a:latin typeface="Lucida Sans" pitchFamily="34" charset="0"/>
+              </a:rPr>
+              <a:t>der Applikation.</a:t>
             </a:r>
             <a:endParaRPr lang="de-CH" altLang="de-DE" sz="2400" dirty="0" smtClean="0">
               <a:solidFill>
@@ -2442,12 +2478,7 @@
 </file>
 
 <file path=customXml/item1.xml><?xml version="1.0" encoding="utf-8"?>
-<?mso-contentType ?>
-<FormTemplates xmlns="http://schemas.microsoft.com/sharepoint/v3/contenttype/forms">
-  <Display>DocumentLibraryForm</Display>
-  <Edit>DocumentLibraryForm</Edit>
-  <New>DocumentLibraryForm</New>
-</FormTemplates>
+<LongProperties xmlns="http://schemas.microsoft.com/office/2006/metadata/longProperties"/>
 </file>
 
 <file path=customXml/item2.xml><?xml version="1.0" encoding="utf-8"?>
@@ -2596,7 +2627,12 @@
 </file>
 
 <file path=customXml/item3.xml><?xml version="1.0" encoding="utf-8"?>
-<LongProperties xmlns="http://schemas.microsoft.com/office/2006/metadata/longProperties"/>
+<?mso-contentType ?>
+<FormTemplates xmlns="http://schemas.microsoft.com/sharepoint/v3/contenttype/forms">
+  <Display>DocumentLibraryForm</Display>
+  <Edit>DocumentLibraryForm</Edit>
+  <New>DocumentLibraryForm</New>
+</FormTemplates>
 </file>
 
 <file path=customXml/item4.xml><?xml version="1.0" encoding="utf-8"?>
@@ -2618,9 +2654,9 @@
 </file>
 
 <file path=customXml/itemProps1.xml><?xml version="1.0" encoding="utf-8"?>
-<ds:datastoreItem xmlns:ds="http://schemas.openxmlformats.org/officeDocument/2006/customXml" ds:itemID="{47870AFC-B140-4E73-B0E2-054A74E7EB25}">
+<ds:datastoreItem xmlns:ds="http://schemas.openxmlformats.org/officeDocument/2006/customXml" ds:itemID="{34ACECAE-8DDC-4218-ADDE-80828E100BF5}">
   <ds:schemaRefs>
-    <ds:schemaRef ds:uri="http://schemas.microsoft.com/sharepoint/v3/contenttype/forms"/>
+    <ds:schemaRef ds:uri="http://schemas.microsoft.com/office/2006/metadata/longProperties"/>
   </ds:schemaRefs>
 </ds:datastoreItem>
 </file>
@@ -2645,9 +2681,9 @@
 </file>
 
 <file path=customXml/itemProps3.xml><?xml version="1.0" encoding="utf-8"?>
-<ds:datastoreItem xmlns:ds="http://schemas.openxmlformats.org/officeDocument/2006/customXml" ds:itemID="{34ACECAE-8DDC-4218-ADDE-80828E100BF5}">
+<ds:datastoreItem xmlns:ds="http://schemas.openxmlformats.org/officeDocument/2006/customXml" ds:itemID="{47870AFC-B140-4E73-B0E2-054A74E7EB25}">
   <ds:schemaRefs>
-    <ds:schemaRef ds:uri="http://schemas.microsoft.com/office/2006/metadata/longProperties"/>
+    <ds:schemaRef ds:uri="http://schemas.microsoft.com/sharepoint/v3/contenttype/forms"/>
   </ds:schemaRefs>
 </ds:datastoreItem>
 </file>

</xml_diff>

<commit_message>
- Finalisierung Plakat - Doku einheitliche Namensgebung Unity-Plugin / Unity-Anwendung
</commit_message>
<xml_diff>
--- a/docs/Plakat/plakat_a1.pptx
+++ b/docs/Plakat/plakat_a1.pptx
@@ -1686,22 +1686,34 @@
               <a:t>Unity</a:t>
             </a:r>
             <a:r>
+              <a:rPr lang="de-CH" altLang="de-DE" sz="2400" dirty="0">
+                <a:latin typeface="Lucida Sans" pitchFamily="34" charset="0"/>
+              </a:rPr>
+              <a:t>-</a:t>
+            </a:r>
+            <a:r>
               <a:rPr lang="de-CH" altLang="de-DE" sz="2400" dirty="0" smtClean="0">
                 <a:latin typeface="Lucida Sans" pitchFamily="34" charset="0"/>
               </a:rPr>
-              <a:t> Anwendungen abdecken zu können, werden etliche Einstellungs-möglichkeiten zu Verfügung gestellt. So können beispielsweise zusätzliche Kameras individuell platziert oder die Darstellung der </a:t>
+              <a:t>Anwendungen </a:t>
             </a:r>
             <a:r>
               <a:rPr lang="de-CH" altLang="de-DE" sz="2400" dirty="0" smtClean="0">
                 <a:latin typeface="Lucida Sans" pitchFamily="34" charset="0"/>
               </a:rPr>
-              <a:t>GUI-Elemente </a:t>
+              <a:t>abdecken zu können, werden etliche </a:t>
             </a:r>
             <a:r>
               <a:rPr lang="de-CH" altLang="de-DE" sz="2400" dirty="0" smtClean="0">
                 <a:latin typeface="Lucida Sans" pitchFamily="34" charset="0"/>
               </a:rPr>
-              <a:t>auf eine CAVE-Leinwand fixiert werden. Weiter sind die Buttons </a:t>
+              <a:t>Einstellungsmöglichkeiten zur </a:t>
+            </a:r>
+            <a:r>
+              <a:rPr lang="de-CH" altLang="de-DE" sz="2400" dirty="0" smtClean="0">
+                <a:latin typeface="Lucida Sans" pitchFamily="34" charset="0"/>
+              </a:rPr>
+              <a:t>Verfügung gestellt. So können beispielsweise zusätzliche Kameras individuell platziert oder die Darstellung der GUI-Elemente auf eine CAVE-Leinwand fixiert werden. Weiter sind die Buttons </a:t>
             </a:r>
             <a:r>
               <a:rPr lang="de-CH" altLang="de-DE" sz="2400" dirty="0">
@@ -1918,7 +1930,7 @@
         </p:blipFill>
         <p:spPr>
           <a:xfrm>
-            <a:off x="20028038" y="11616800"/>
+            <a:off x="20028038" y="11816795"/>
             <a:ext cx="7957416" cy="5481956"/>
           </a:xfrm>
           <a:prstGeom prst="rect">
@@ -1948,7 +1960,7 @@
         </p:blipFill>
         <p:spPr>
           <a:xfrm>
-            <a:off x="1025777" y="6419116"/>
+            <a:off x="1000377" y="6673116"/>
             <a:ext cx="17084424" cy="10395369"/>
           </a:xfrm>
           <a:prstGeom prst="rect">
@@ -1964,7 +1976,7 @@
         </p:nvSpPr>
         <p:spPr>
           <a:xfrm>
-            <a:off x="898778" y="937998"/>
+            <a:off x="898778" y="880848"/>
             <a:ext cx="17160623" cy="5324535"/>
           </a:xfrm>
           <a:prstGeom prst="rect">
@@ -2087,7 +2099,19 @@
               <a:rPr lang="de-CH" altLang="de-DE" sz="2400" dirty="0" smtClean="0">
                 <a:latin typeface="Lucida Sans" pitchFamily="34" charset="0"/>
               </a:rPr>
-              <a:t> Applikationen sollen möglichst einfach in das Multi-Screen Rendering Setup des CAVEs integriert werden können. Das Trackingsystem von </a:t>
+              <a:t> Applikationen sollen möglichst einfach in das Multi-Screen Rendering Setup des CAVEs integriert werden </a:t>
+            </a:r>
+            <a:r>
+              <a:rPr lang="de-CH" altLang="de-DE" sz="2400" dirty="0" smtClean="0">
+                <a:latin typeface="Lucida Sans" pitchFamily="34" charset="0"/>
+              </a:rPr>
+              <a:t>können, damit die Anwendung in 3D erlebt werden kann. </a:t>
+            </a:r>
+            <a:r>
+              <a:rPr lang="de-CH" altLang="de-DE" sz="2400" dirty="0" smtClean="0">
+                <a:latin typeface="Lucida Sans" pitchFamily="34" charset="0"/>
+              </a:rPr>
+              <a:t>Das Trackingsystem von </a:t>
             </a:r>
             <a:r>
               <a:rPr lang="de-CH" altLang="de-DE" sz="2400" dirty="0" err="1" smtClean="0">
@@ -2138,19 +2162,31 @@
               <a:rPr lang="de-CH" altLang="de-DE" sz="2400" dirty="0" smtClean="0">
                 <a:latin typeface="Lucida Sans" pitchFamily="34" charset="0"/>
               </a:rPr>
-              <a:t>Der Hauptbestandteil der Umsetzung </a:t>
+              <a:t>Der Hauptbestandteil </a:t>
             </a:r>
             <a:r>
               <a:rPr lang="de-CH" altLang="de-DE" sz="2400" dirty="0" smtClean="0">
                 <a:latin typeface="Lucida Sans" pitchFamily="34" charset="0"/>
               </a:rPr>
-              <a:t>ist die </a:t>
+              <a:t>des Umsetzung ist </a:t>
             </a:r>
             <a:r>
               <a:rPr lang="de-CH" altLang="de-DE" sz="2400" dirty="0" smtClean="0">
                 <a:latin typeface="Lucida Sans" pitchFamily="34" charset="0"/>
               </a:rPr>
-              <a:t>virtuelle Abbildung der Komponenten. Mit Hilfe von </a:t>
+              <a:t>die virtuelle Abbildung der </a:t>
+            </a:r>
+            <a:r>
+              <a:rPr lang="de-CH" altLang="de-DE" sz="2400" dirty="0" smtClean="0">
+                <a:latin typeface="Lucida Sans" pitchFamily="34" charset="0"/>
+              </a:rPr>
+              <a:t>Komponenten in der Anwendung. </a:t>
+            </a:r>
+            <a:r>
+              <a:rPr lang="de-CH" altLang="de-DE" sz="2400" dirty="0" smtClean="0">
+                <a:latin typeface="Lucida Sans" pitchFamily="34" charset="0"/>
+              </a:rPr>
+              <a:t>Mit Hilfe von </a:t>
             </a:r>
             <a:r>
               <a:rPr lang="de-CH" altLang="de-DE" sz="2400" dirty="0" err="1" smtClean="0">
@@ -2162,36 +2198,80 @@
               <a:rPr lang="de-CH" altLang="de-DE" sz="2400" dirty="0" smtClean="0">
                 <a:latin typeface="Lucida Sans" pitchFamily="34" charset="0"/>
               </a:rPr>
-              <a:t> </a:t>
-            </a:r>
-            <a:r>
-              <a:rPr lang="de-CH" altLang="de-DE" sz="2400" dirty="0" smtClean="0">
-                <a:latin typeface="Lucida Sans" pitchFamily="34" charset="0"/>
-              </a:rPr>
-              <a:t>wird die </a:t>
-            </a:r>
-            <a:r>
-              <a:rPr lang="de-CH" altLang="de-DE" sz="2400" dirty="0" smtClean="0">
-                <a:latin typeface="Lucida Sans" pitchFamily="34" charset="0"/>
-              </a:rPr>
-              <a:t>Weiterverarbeitung und Interpretation vereinfacht und ist somit Basis </a:t>
-            </a:r>
-            <a:r>
-              <a:rPr lang="de-CH" altLang="de-DE" sz="2400" dirty="0" smtClean="0">
-                <a:latin typeface="Lucida Sans" pitchFamily="34" charset="0"/>
-              </a:rPr>
-              <a:t>für sämtliche Manipulationen </a:t>
-            </a:r>
-            <a:r>
-              <a:rPr lang="de-CH" altLang="de-DE" sz="2400" dirty="0" smtClean="0">
-                <a:latin typeface="Lucida Sans" pitchFamily="34" charset="0"/>
-              </a:rPr>
-              <a:t>der Applikation.</a:t>
+              <a:t> wird die Weiterverarbeitung und Interpretation vereinfacht und ist somit Basis für sämtliche Manipulationen der Applikation.</a:t>
             </a:r>
             <a:endParaRPr lang="de-CH" altLang="de-DE" sz="2400" dirty="0" smtClean="0">
               <a:solidFill>
                 <a:srgbClr val="697D91"/>
               </a:solidFill>
+              <a:latin typeface="Lucida Sans" pitchFamily="34" charset="0"/>
+            </a:endParaRPr>
+          </a:p>
+        </p:txBody>
+      </p:sp>
+      <p:sp>
+        <p:nvSpPr>
+          <p:cNvPr id="10" name="Textfeld 9"/>
+          <p:cNvSpPr txBox="1"/>
+          <p:nvPr/>
+        </p:nvSpPr>
+        <p:spPr>
+          <a:xfrm>
+            <a:off x="18843172" y="16293108"/>
+            <a:ext cx="10359160" cy="707886"/>
+          </a:xfrm>
+          <a:prstGeom prst="rect">
+            <a:avLst/>
+          </a:prstGeom>
+          <a:noFill/>
+        </p:spPr>
+        <p:txBody>
+          <a:bodyPr wrap="square" rtlCol="0">
+            <a:spAutoFit/>
+          </a:bodyPr>
+          <a:lstStyle/>
+          <a:p>
+            <a:pPr algn="ctr">
+              <a:buClr>
+                <a:srgbClr val="FAA500"/>
+              </a:buClr>
+              <a:buSzPct val="80000"/>
+              <a:defRPr/>
+            </a:pPr>
+            <a:r>
+              <a:rPr lang="de-CH" altLang="de-DE" sz="2000" dirty="0" smtClean="0">
+                <a:latin typeface="Lucida Sans" pitchFamily="34" charset="0"/>
+              </a:rPr>
+              <a:t>Setzen Sie </a:t>
+            </a:r>
+            <a:r>
+              <a:rPr lang="de-CH" altLang="de-DE" sz="2000" dirty="0" smtClean="0">
+                <a:latin typeface="Lucida Sans" pitchFamily="34" charset="0"/>
+              </a:rPr>
+              <a:t>die Anaglyphenbrille</a:t>
+            </a:r>
+          </a:p>
+          <a:p>
+            <a:pPr algn="ctr">
+              <a:buClr>
+                <a:srgbClr val="FAA500"/>
+              </a:buClr>
+              <a:buSzPct val="80000"/>
+              <a:defRPr/>
+            </a:pPr>
+            <a:r>
+              <a:rPr lang="de-CH" altLang="de-DE" sz="2000" dirty="0" smtClean="0">
+                <a:latin typeface="Lucida Sans" pitchFamily="34" charset="0"/>
+              </a:rPr>
+              <a:t>auf und sehen sie mich in 3D</a:t>
+            </a:r>
+            <a:r>
+              <a:rPr lang="de-CH" altLang="de-DE" sz="2000" dirty="0" smtClean="0">
+                <a:latin typeface="Lucida Sans" pitchFamily="34" charset="0"/>
+              </a:rPr>
+              <a:t>!</a:t>
+            </a:r>
+            <a:endParaRPr lang="de-CH" altLang="de-DE" sz="2000" dirty="0" smtClean="0">
               <a:latin typeface="Lucida Sans" pitchFamily="34" charset="0"/>
             </a:endParaRPr>
           </a:p>
@@ -2478,7 +2558,12 @@
 </file>
 
 <file path=customXml/item1.xml><?xml version="1.0" encoding="utf-8"?>
-<LongProperties xmlns="http://schemas.microsoft.com/office/2006/metadata/longProperties"/>
+<?mso-contentType ?>
+<FormTemplates xmlns="http://schemas.microsoft.com/sharepoint/v3/contenttype/forms">
+  <Display>DocumentLibraryForm</Display>
+  <Edit>DocumentLibraryForm</Edit>
+  <New>DocumentLibraryForm</New>
+</FormTemplates>
 </file>
 
 <file path=customXml/item2.xml><?xml version="1.0" encoding="utf-8"?>
@@ -2627,12 +2712,7 @@
 </file>
 
 <file path=customXml/item3.xml><?xml version="1.0" encoding="utf-8"?>
-<?mso-contentType ?>
-<FormTemplates xmlns="http://schemas.microsoft.com/sharepoint/v3/contenttype/forms">
-  <Display>DocumentLibraryForm</Display>
-  <Edit>DocumentLibraryForm</Edit>
-  <New>DocumentLibraryForm</New>
-</FormTemplates>
+<LongProperties xmlns="http://schemas.microsoft.com/office/2006/metadata/longProperties"/>
 </file>
 
 <file path=customXml/item4.xml><?xml version="1.0" encoding="utf-8"?>
@@ -2654,9 +2734,9 @@
 </file>
 
 <file path=customXml/itemProps1.xml><?xml version="1.0" encoding="utf-8"?>
-<ds:datastoreItem xmlns:ds="http://schemas.openxmlformats.org/officeDocument/2006/customXml" ds:itemID="{34ACECAE-8DDC-4218-ADDE-80828E100BF5}">
+<ds:datastoreItem xmlns:ds="http://schemas.openxmlformats.org/officeDocument/2006/customXml" ds:itemID="{47870AFC-B140-4E73-B0E2-054A74E7EB25}">
   <ds:schemaRefs>
-    <ds:schemaRef ds:uri="http://schemas.microsoft.com/office/2006/metadata/longProperties"/>
+    <ds:schemaRef ds:uri="http://schemas.microsoft.com/sharepoint/v3/contenttype/forms"/>
   </ds:schemaRefs>
 </ds:datastoreItem>
 </file>
@@ -2681,9 +2761,9 @@
 </file>
 
 <file path=customXml/itemProps3.xml><?xml version="1.0" encoding="utf-8"?>
-<ds:datastoreItem xmlns:ds="http://schemas.openxmlformats.org/officeDocument/2006/customXml" ds:itemID="{47870AFC-B140-4E73-B0E2-054A74E7EB25}">
+<ds:datastoreItem xmlns:ds="http://schemas.openxmlformats.org/officeDocument/2006/customXml" ds:itemID="{34ACECAE-8DDC-4218-ADDE-80828E100BF5}">
   <ds:schemaRefs>
-    <ds:schemaRef ds:uri="http://schemas.microsoft.com/sharepoint/v3/contenttype/forms"/>
+    <ds:schemaRef ds:uri="http://schemas.microsoft.com/office/2006/metadata/longProperties"/>
   </ds:schemaRefs>
 </ds:datastoreItem>
 </file>

</xml_diff>

<commit_message>
Update Plakat gemäss Feedback Künzler (teils)
</commit_message>
<xml_diff>
--- a/docs/Plakat/plakat_a1.pptx
+++ b/docs/Plakat/plakat_a1.pptx
@@ -1646,7 +1646,7 @@
               <a:buSzPct val="80000"/>
               <a:defRPr/>
             </a:pPr>
-            <a:endParaRPr lang="de-CH" altLang="de-DE" sz="3200" dirty="0" smtClean="0">
+            <a:endParaRPr lang="de-CH" altLang="de-DE" sz="2400" dirty="0" smtClean="0">
               <a:solidFill>
                 <a:srgbClr val="697D91"/>
               </a:solidFill>
@@ -1695,61 +1695,25 @@
               <a:rPr lang="de-CH" altLang="de-DE" sz="2400" dirty="0" smtClean="0">
                 <a:latin typeface="Lucida Sans" pitchFamily="34" charset="0"/>
               </a:rPr>
-              <a:t>Anwendungen </a:t>
+              <a:t>Anwendungen abdecken zu können, werden etliche Einstellungsmöglichkeiten zur Verfügung gestellt. So können beispielsweise zusätzliche Kameras individuell platziert oder die Darstellung der GUI-Elemente auf eine CAVE-Leinwand fixiert werden. Weiter lassen sich die Buttons </a:t>
+            </a:r>
+            <a:r>
+              <a:rPr lang="de-CH" altLang="de-DE" sz="2400" dirty="0">
+                <a:latin typeface="Lucida Sans" pitchFamily="34" charset="0"/>
+              </a:rPr>
+              <a:t>auf dem </a:t>
+            </a:r>
+            <a:r>
+              <a:rPr lang="de-CH" altLang="de-DE" sz="2400" dirty="0" err="1" smtClean="0">
+                <a:latin typeface="Lucida Sans" pitchFamily="34" charset="0"/>
+              </a:rPr>
+              <a:t>WorldViz</a:t>
             </a:r>
             <a:r>
               <a:rPr lang="de-CH" altLang="de-DE" sz="2400" dirty="0" smtClean="0">
                 <a:latin typeface="Lucida Sans" pitchFamily="34" charset="0"/>
               </a:rPr>
-              <a:t>abdecken zu können, werden etliche Einstellungsmöglichkeiten zur Verfügung gestellt. So können beispielsweise zusätzliche Kameras individuell platziert oder die Darstellung der GUI-Elemente auf eine CAVE-Leinwand fixiert werden. </a:t>
-            </a:r>
-            <a:r>
-              <a:rPr lang="de-CH" altLang="de-DE" sz="2400" dirty="0" smtClean="0">
-                <a:latin typeface="Lucida Sans" pitchFamily="34" charset="0"/>
-              </a:rPr>
-              <a:t>Weiter lassen sich </a:t>
-            </a:r>
-            <a:r>
-              <a:rPr lang="de-CH" altLang="de-DE" sz="2400" dirty="0" smtClean="0">
-                <a:latin typeface="Lucida Sans" pitchFamily="34" charset="0"/>
-              </a:rPr>
-              <a:t>die </a:t>
-            </a:r>
-            <a:r>
-              <a:rPr lang="de-CH" altLang="de-DE" sz="2400" dirty="0" smtClean="0">
-                <a:latin typeface="Lucida Sans" pitchFamily="34" charset="0"/>
-              </a:rPr>
-              <a:t>Buttons </a:t>
-            </a:r>
-            <a:r>
-              <a:rPr lang="de-CH" altLang="de-DE" sz="2400" dirty="0">
-                <a:latin typeface="Lucida Sans" pitchFamily="34" charset="0"/>
-              </a:rPr>
-              <a:t>auf dem </a:t>
-            </a:r>
-            <a:r>
-              <a:rPr lang="de-CH" altLang="de-DE" sz="2400" dirty="0" err="1" smtClean="0">
-                <a:latin typeface="Lucida Sans" pitchFamily="34" charset="0"/>
-              </a:rPr>
-              <a:t>WorldViz</a:t>
-            </a:r>
-            <a:r>
-              <a:rPr lang="de-CH" altLang="de-DE" sz="2400" dirty="0" smtClean="0">
-                <a:latin typeface="Lucida Sans" pitchFamily="34" charset="0"/>
-              </a:rPr>
-              <a:t> Wand, dem primären Inputgerät, </a:t>
-            </a:r>
-            <a:r>
-              <a:rPr lang="de-CH" altLang="de-DE" sz="2400" dirty="0" smtClean="0">
-                <a:latin typeface="Lucida Sans" pitchFamily="34" charset="0"/>
-              </a:rPr>
-              <a:t>frei zuordnen, </a:t>
-            </a:r>
-            <a:r>
-              <a:rPr lang="de-CH" altLang="de-DE" sz="2400" dirty="0" smtClean="0">
-                <a:latin typeface="Lucida Sans" pitchFamily="34" charset="0"/>
-              </a:rPr>
-              <a:t>um der eigenen Applikation zu entsprechen. Falls auf Wunsch nur spezifische Achsen bei der Weiterverarbeitung der Devices beachtet werden sollen, können diese auch frei ein- und ausgeschaltet werden.</a:t>
+              <a:t> Wand, dem primären Inputgerät, frei zuordnen, um der eigenen Applikation zu entsprechen. Falls auf Wunsch nur spezifische Achsen bei der Weiterverarbeitung der Devices beachtet werden sollen, können diese auch frei ein- und ausgeschaltet werden.</a:t>
             </a:r>
           </a:p>
           <a:p>
@@ -1995,7 +1959,7 @@
         <p:spPr>
           <a:xfrm>
             <a:off x="898778" y="880848"/>
-            <a:ext cx="17160623" cy="5324535"/>
+            <a:ext cx="17160623" cy="5509200"/>
           </a:xfrm>
           <a:prstGeom prst="rect">
             <a:avLst/>
@@ -2021,164 +1985,14 @@
                 </a:solidFill>
                 <a:latin typeface="Lucida Sans"/>
               </a:rPr>
-              <a:t>Ausgangslage und </a:t>
-            </a:r>
-            <a:r>
-              <a:rPr lang="de-CH" altLang="de-DE" sz="4400" dirty="0">
-                <a:solidFill>
-                  <a:srgbClr val="697D91"/>
-                </a:solidFill>
-                <a:latin typeface="Lucida Sans"/>
-              </a:rPr>
-              <a:t>Umsetzung</a:t>
-            </a:r>
-          </a:p>
-          <a:p>
-            <a:pPr algn="just">
-              <a:buClr>
-                <a:srgbClr val="FAA500"/>
-              </a:buClr>
-              <a:buSzPct val="80000"/>
-              <a:defRPr/>
-            </a:pPr>
-            <a:endParaRPr lang="de-CH" altLang="de-DE" sz="3200" dirty="0">
-              <a:latin typeface="Lucida Sans" pitchFamily="34" charset="0"/>
+              <a:t>Ausgangslage</a:t>
+            </a:r>
+            <a:endParaRPr lang="de-CH" altLang="de-DE" sz="4400" dirty="0">
+              <a:solidFill>
+                <a:srgbClr val="697D91"/>
+              </a:solidFill>
+              <a:latin typeface="Lucida Sans"/>
             </a:endParaRPr>
-          </a:p>
-          <a:p>
-            <a:pPr algn="just">
-              <a:buClr>
-                <a:srgbClr val="FAA500"/>
-              </a:buClr>
-              <a:buSzPct val="80000"/>
-              <a:defRPr/>
-            </a:pPr>
-            <a:r>
-              <a:rPr lang="de-CH" altLang="de-DE" sz="2400" dirty="0" smtClean="0">
-                <a:latin typeface="Lucida Sans" pitchFamily="34" charset="0"/>
-              </a:rPr>
-              <a:t>Neben der bestehenden CAVE Cluster-Rendering Lösung soll ein </a:t>
-            </a:r>
-            <a:r>
-              <a:rPr lang="de-CH" altLang="de-DE" sz="2400" dirty="0" err="1" smtClean="0">
-                <a:latin typeface="Lucida Sans" pitchFamily="34" charset="0"/>
-              </a:rPr>
-              <a:t>Unity</a:t>
-            </a:r>
-            <a:r>
-              <a:rPr lang="de-CH" altLang="de-DE" sz="2400" dirty="0" smtClean="0">
-                <a:latin typeface="Lucida Sans" pitchFamily="34" charset="0"/>
-              </a:rPr>
-              <a:t> 3D </a:t>
-            </a:r>
-            <a:r>
-              <a:rPr lang="de-CH" altLang="de-DE" sz="2400" dirty="0" err="1" smtClean="0">
-                <a:latin typeface="Lucida Sans" pitchFamily="34" charset="0"/>
-              </a:rPr>
-              <a:t>Render</a:t>
-            </a:r>
-            <a:r>
-              <a:rPr lang="de-CH" altLang="de-DE" sz="2400" dirty="0" smtClean="0">
-                <a:latin typeface="Lucida Sans" pitchFamily="34" charset="0"/>
-              </a:rPr>
-              <a:t>-Server in Betrieb genommen werden, um der zunehmenden Bedeutung von </a:t>
-            </a:r>
-            <a:r>
-              <a:rPr lang="de-CH" altLang="de-DE" sz="2400" dirty="0" err="1" smtClean="0">
-                <a:latin typeface="Lucida Sans" pitchFamily="34" charset="0"/>
-              </a:rPr>
-              <a:t>Unity</a:t>
-            </a:r>
-            <a:r>
-              <a:rPr lang="de-CH" altLang="de-DE" sz="2400" dirty="0" smtClean="0">
-                <a:latin typeface="Lucida Sans" pitchFamily="34" charset="0"/>
-              </a:rPr>
-              <a:t> im </a:t>
-            </a:r>
-            <a:r>
-              <a:rPr lang="de-CH" altLang="de-DE" sz="2400" dirty="0" err="1" smtClean="0">
-                <a:latin typeface="Lucida Sans" pitchFamily="34" charset="0"/>
-              </a:rPr>
-              <a:t>CPVRLab</a:t>
-            </a:r>
-            <a:r>
-              <a:rPr lang="de-CH" altLang="de-DE" sz="2400" dirty="0" smtClean="0">
-                <a:latin typeface="Lucida Sans" pitchFamily="34" charset="0"/>
-              </a:rPr>
-              <a:t> und im Unterricht Rechnung zu tragen. Bestehende oder neue </a:t>
-            </a:r>
-            <a:r>
-              <a:rPr lang="de-CH" altLang="de-DE" sz="2400" dirty="0" err="1" smtClean="0">
-                <a:latin typeface="Lucida Sans" pitchFamily="34" charset="0"/>
-              </a:rPr>
-              <a:t>Unity</a:t>
-            </a:r>
-            <a:r>
-              <a:rPr lang="de-CH" altLang="de-DE" sz="2400" dirty="0" smtClean="0">
-                <a:latin typeface="Lucida Sans" pitchFamily="34" charset="0"/>
-              </a:rPr>
-              <a:t> </a:t>
-            </a:r>
-            <a:r>
-              <a:rPr lang="de-CH" altLang="de-DE" sz="2400" dirty="0" smtClean="0">
-                <a:latin typeface="Lucida Sans" pitchFamily="34" charset="0"/>
-              </a:rPr>
-              <a:t>Applikationen </a:t>
-            </a:r>
-            <a:r>
-              <a:rPr lang="de-CH" altLang="de-DE" sz="2400" dirty="0" smtClean="0">
-                <a:latin typeface="Lucida Sans" pitchFamily="34" charset="0"/>
-              </a:rPr>
-              <a:t>sollen möglichst einfach in das Multi-Screen Rendering Setup des CAVEs integriert werden können, damit </a:t>
-            </a:r>
-            <a:r>
-              <a:rPr lang="de-CH" altLang="de-DE" sz="2400" dirty="0" smtClean="0">
-                <a:latin typeface="Lucida Sans" pitchFamily="34" charset="0"/>
-              </a:rPr>
-              <a:t>Anwendungen </a:t>
-            </a:r>
-            <a:r>
-              <a:rPr lang="de-CH" altLang="de-DE" sz="2400" dirty="0" smtClean="0">
-                <a:latin typeface="Lucida Sans" pitchFamily="34" charset="0"/>
-              </a:rPr>
-              <a:t>in 3D erlebt werden </a:t>
-            </a:r>
-            <a:r>
-              <a:rPr lang="de-CH" altLang="de-DE" sz="2400" dirty="0" smtClean="0">
-                <a:latin typeface="Lucida Sans" pitchFamily="34" charset="0"/>
-              </a:rPr>
-              <a:t>können. </a:t>
-            </a:r>
-            <a:r>
-              <a:rPr lang="de-CH" altLang="de-DE" sz="2400" dirty="0" smtClean="0">
-                <a:latin typeface="Lucida Sans" pitchFamily="34" charset="0"/>
-              </a:rPr>
-              <a:t>Das Trackingsystem von </a:t>
-            </a:r>
-            <a:r>
-              <a:rPr lang="de-CH" altLang="de-DE" sz="2400" dirty="0" err="1" smtClean="0">
-                <a:latin typeface="Lucida Sans" pitchFamily="34" charset="0"/>
-              </a:rPr>
-              <a:t>WorldViz</a:t>
-            </a:r>
-            <a:r>
-              <a:rPr lang="de-CH" altLang="de-DE" sz="2400" dirty="0" smtClean="0">
-                <a:latin typeface="Lucida Sans" pitchFamily="34" charset="0"/>
-              </a:rPr>
-              <a:t>, um die Position des Benutzers im CAVE ermitteln zu können, soll ebenfalls mit der neuen Lösung zum Einsatz kommen. Die Aufnahme der verschiedenen </a:t>
-            </a:r>
-            <a:r>
-              <a:rPr lang="de-CH" altLang="de-DE" sz="2400" dirty="0" err="1" smtClean="0">
-                <a:latin typeface="Lucida Sans" pitchFamily="34" charset="0"/>
-              </a:rPr>
-              <a:t>Trackingdevices</a:t>
-            </a:r>
-            <a:r>
-              <a:rPr lang="de-CH" altLang="de-DE" sz="2400" dirty="0" smtClean="0">
-                <a:latin typeface="Lucida Sans" pitchFamily="34" charset="0"/>
-              </a:rPr>
-              <a:t> mittels Infrarotkameras soll dazu dienen, die virtuellen Kameras der Applikation entsprechend zu setzen und die Anwendung weitgehend bedienen zu können.</a:t>
-            </a:r>
           </a:p>
           <a:p>
             <a:pPr algn="just">
@@ -2204,7 +2018,7 @@
               <a:rPr lang="de-CH" altLang="de-DE" sz="2400" dirty="0" smtClean="0">
                 <a:latin typeface="Lucida Sans" pitchFamily="34" charset="0"/>
               </a:rPr>
-              <a:t>Der Hauptbestandteil des Umsetzung ist die virtuelle Abbildung der Komponenten in der Anwendung. Mit Hilfe von </a:t>
+              <a:t>Neben der bestehenden CAVE Cluster-Rendering Lösung soll ein </a:t>
             </a:r>
             <a:r>
               <a:rPr lang="de-CH" altLang="de-DE" sz="2400" dirty="0" err="1" smtClean="0">
@@ -2216,7 +2030,211 @@
               <a:rPr lang="de-CH" altLang="de-DE" sz="2400" dirty="0" smtClean="0">
                 <a:latin typeface="Lucida Sans" pitchFamily="34" charset="0"/>
               </a:rPr>
-              <a:t> wird die Weiterverarbeitung und Interpretation vereinfacht und ist somit Basis für sämtliche Manipulationen der Applikation.</a:t>
+              <a:t> 3D </a:t>
+            </a:r>
+            <a:r>
+              <a:rPr lang="de-CH" altLang="de-DE" sz="2400" dirty="0" err="1" smtClean="0">
+                <a:latin typeface="Lucida Sans" pitchFamily="34" charset="0"/>
+              </a:rPr>
+              <a:t>Render</a:t>
+            </a:r>
+            <a:r>
+              <a:rPr lang="de-CH" altLang="de-DE" sz="2400" dirty="0" smtClean="0">
+                <a:latin typeface="Lucida Sans" pitchFamily="34" charset="0"/>
+              </a:rPr>
+              <a:t>-Server in Betrieb genommen werden, um der zunehmenden Bedeutung von </a:t>
+            </a:r>
+            <a:r>
+              <a:rPr lang="de-CH" altLang="de-DE" sz="2400" dirty="0" err="1" smtClean="0">
+                <a:latin typeface="Lucida Sans" pitchFamily="34" charset="0"/>
+              </a:rPr>
+              <a:t>Unity</a:t>
+            </a:r>
+            <a:r>
+              <a:rPr lang="de-CH" altLang="de-DE" sz="2400" dirty="0" smtClean="0">
+                <a:latin typeface="Lucida Sans" pitchFamily="34" charset="0"/>
+              </a:rPr>
+              <a:t> im </a:t>
+            </a:r>
+            <a:r>
+              <a:rPr lang="de-CH" altLang="de-DE" sz="2400" dirty="0" err="1" smtClean="0">
+                <a:latin typeface="Lucida Sans" pitchFamily="34" charset="0"/>
+              </a:rPr>
+              <a:t>CPVRLab</a:t>
+            </a:r>
+            <a:r>
+              <a:rPr lang="de-CH" altLang="de-DE" sz="2400" dirty="0" smtClean="0">
+                <a:latin typeface="Lucida Sans" pitchFamily="34" charset="0"/>
+              </a:rPr>
+              <a:t> und im Unterricht Rechnung zu tragen. Bestehende oder neue </a:t>
+            </a:r>
+            <a:r>
+              <a:rPr lang="de-CH" altLang="de-DE" sz="2400" dirty="0" err="1" smtClean="0">
+                <a:latin typeface="Lucida Sans" pitchFamily="34" charset="0"/>
+              </a:rPr>
+              <a:t>Unity</a:t>
+            </a:r>
+            <a:r>
+              <a:rPr lang="de-CH" altLang="de-DE" sz="2400" dirty="0" smtClean="0">
+                <a:latin typeface="Lucida Sans" pitchFamily="34" charset="0"/>
+              </a:rPr>
+              <a:t> Applikationen sollen möglichst einfach in das Multi-Screen Rendering Setup des CAVEs integriert werden können, </a:t>
+            </a:r>
+            <a:r>
+              <a:rPr lang="de-CH" altLang="de-DE" sz="2400" dirty="0" smtClean="0">
+                <a:latin typeface="Lucida Sans" pitchFamily="34" charset="0"/>
+              </a:rPr>
+              <a:t>um Anwendungen </a:t>
+            </a:r>
+            <a:r>
+              <a:rPr lang="de-CH" altLang="de-DE" sz="2400" dirty="0" smtClean="0">
+                <a:latin typeface="Lucida Sans" pitchFamily="34" charset="0"/>
+              </a:rPr>
+              <a:t>in 3D </a:t>
+            </a:r>
+            <a:r>
+              <a:rPr lang="de-CH" altLang="de-DE" sz="2400" dirty="0" smtClean="0">
+                <a:latin typeface="Lucida Sans" pitchFamily="34" charset="0"/>
+              </a:rPr>
+              <a:t>zu erleben. </a:t>
+            </a:r>
+            <a:r>
+              <a:rPr lang="de-CH" altLang="de-DE" sz="2400" dirty="0" smtClean="0">
+                <a:latin typeface="Lucida Sans" pitchFamily="34" charset="0"/>
+              </a:rPr>
+              <a:t>Das Trackingsystem von </a:t>
+            </a:r>
+            <a:r>
+              <a:rPr lang="de-CH" altLang="de-DE" sz="2400" dirty="0" err="1" smtClean="0">
+                <a:latin typeface="Lucida Sans" pitchFamily="34" charset="0"/>
+              </a:rPr>
+              <a:t>WorldViz</a:t>
+            </a:r>
+            <a:r>
+              <a:rPr lang="de-CH" altLang="de-DE" sz="2400" dirty="0" smtClean="0">
+                <a:latin typeface="Lucida Sans" pitchFamily="34" charset="0"/>
+              </a:rPr>
+              <a:t>, welches die Ermittlung der Position des Benutzers im CAVE ermöglicht, </a:t>
+            </a:r>
+            <a:r>
+              <a:rPr lang="de-CH" altLang="de-DE" sz="2400" dirty="0" smtClean="0">
+                <a:latin typeface="Lucida Sans" pitchFamily="34" charset="0"/>
+              </a:rPr>
+              <a:t>soll ebenfalls </a:t>
+            </a:r>
+            <a:r>
+              <a:rPr lang="de-CH" altLang="de-DE" sz="2400" dirty="0" smtClean="0">
+                <a:latin typeface="Lucida Sans" pitchFamily="34" charset="0"/>
+              </a:rPr>
+              <a:t>zum </a:t>
+            </a:r>
+            <a:r>
+              <a:rPr lang="de-CH" altLang="de-DE" sz="2400" dirty="0" smtClean="0">
+                <a:latin typeface="Lucida Sans" pitchFamily="34" charset="0"/>
+              </a:rPr>
+              <a:t>Einsatz kommen</a:t>
+            </a:r>
+            <a:r>
+              <a:rPr lang="de-CH" altLang="de-DE" sz="2400" dirty="0" smtClean="0">
+                <a:latin typeface="Lucida Sans" pitchFamily="34" charset="0"/>
+              </a:rPr>
+              <a:t>.</a:t>
+            </a:r>
+          </a:p>
+          <a:p>
+            <a:pPr algn="just">
+              <a:buClr>
+                <a:srgbClr val="FAA500"/>
+              </a:buClr>
+              <a:buSzPct val="80000"/>
+              <a:defRPr/>
+            </a:pPr>
+            <a:endParaRPr lang="de-CH" altLang="de-DE" sz="2400" dirty="0">
+              <a:latin typeface="Lucida Sans" pitchFamily="34" charset="0"/>
+            </a:endParaRPr>
+          </a:p>
+          <a:p>
+            <a:pPr lvl="0" algn="just">
+              <a:buClr>
+                <a:srgbClr val="FAA500"/>
+              </a:buClr>
+              <a:buSzPct val="80000"/>
+              <a:defRPr/>
+            </a:pPr>
+            <a:r>
+              <a:rPr lang="de-CH" altLang="de-DE" sz="4400" dirty="0" smtClean="0">
+                <a:solidFill>
+                  <a:srgbClr val="697D91"/>
+                </a:solidFill>
+                <a:latin typeface="Lucida Sans"/>
+              </a:rPr>
+              <a:t>Umsetzung</a:t>
+            </a:r>
+            <a:endParaRPr lang="de-CH" altLang="de-DE" sz="4400" dirty="0">
+              <a:solidFill>
+                <a:srgbClr val="697D91"/>
+              </a:solidFill>
+              <a:latin typeface="Lucida Sans"/>
+            </a:endParaRPr>
+          </a:p>
+          <a:p>
+            <a:pPr algn="just">
+              <a:buClr>
+                <a:srgbClr val="FAA500"/>
+              </a:buClr>
+              <a:buSzPct val="80000"/>
+              <a:defRPr/>
+            </a:pPr>
+            <a:endParaRPr lang="de-CH" altLang="de-DE" sz="2400" dirty="0">
+              <a:solidFill>
+                <a:srgbClr val="697D91"/>
+              </a:solidFill>
+              <a:latin typeface="Lucida Sans"/>
+            </a:endParaRPr>
+          </a:p>
+          <a:p>
+            <a:pPr algn="just">
+              <a:buClr>
+                <a:srgbClr val="FAA500"/>
+              </a:buClr>
+              <a:buSzPct val="80000"/>
+              <a:defRPr/>
+            </a:pPr>
+            <a:r>
+              <a:rPr lang="de-CH" altLang="de-DE" sz="2400" dirty="0" smtClean="0">
+                <a:latin typeface="Lucida Sans" pitchFamily="34" charset="0"/>
+              </a:rPr>
+              <a:t>Der </a:t>
+            </a:r>
+            <a:r>
+              <a:rPr lang="de-CH" altLang="de-DE" sz="2400" dirty="0" smtClean="0">
+                <a:latin typeface="Lucida Sans" pitchFamily="34" charset="0"/>
+              </a:rPr>
+              <a:t>Hauptbestandteil des Umsetzung ist die virtuelle Abbildung der Komponenten in der Anwendung. Mit Hilfe von </a:t>
+            </a:r>
+            <a:r>
+              <a:rPr lang="de-CH" altLang="de-DE" sz="2400" dirty="0" err="1" smtClean="0">
+                <a:latin typeface="Lucida Sans" pitchFamily="34" charset="0"/>
+              </a:rPr>
+              <a:t>Unity</a:t>
+            </a:r>
+            <a:r>
+              <a:rPr lang="de-CH" altLang="de-DE" sz="2400" dirty="0" smtClean="0">
+                <a:latin typeface="Lucida Sans" pitchFamily="34" charset="0"/>
+              </a:rPr>
+              <a:t> wird die Weiterverarbeitung </a:t>
+            </a:r>
+            <a:r>
+              <a:rPr lang="de-CH" altLang="de-DE" sz="2400" dirty="0" smtClean="0">
+                <a:latin typeface="Lucida Sans" pitchFamily="34" charset="0"/>
+              </a:rPr>
+              <a:t>und Interpretation vereinfacht </a:t>
+            </a:r>
+            <a:r>
+              <a:rPr lang="de-CH" altLang="de-DE" sz="2400" dirty="0" smtClean="0">
+                <a:latin typeface="Lucida Sans" pitchFamily="34" charset="0"/>
+              </a:rPr>
+              <a:t>und ist somit Basis für sämtliche Manipulationen der Applikation.</a:t>
             </a:r>
             <a:endParaRPr lang="de-CH" altLang="de-DE" sz="2400" dirty="0" smtClean="0">
               <a:solidFill>
@@ -2561,7 +2579,12 @@
 </file>
 
 <file path=customXml/item1.xml><?xml version="1.0" encoding="utf-8"?>
-<LongProperties xmlns="http://schemas.microsoft.com/office/2006/metadata/longProperties"/>
+<?mso-contentType ?>
+<FormTemplates xmlns="http://schemas.microsoft.com/sharepoint/v3/contenttype/forms">
+  <Display>DocumentLibraryForm</Display>
+  <Edit>DocumentLibraryForm</Edit>
+  <New>DocumentLibraryForm</New>
+</FormTemplates>
 </file>
 
 <file path=customXml/item2.xml><?xml version="1.0" encoding="utf-8"?>
@@ -2710,12 +2733,7 @@
 </file>
 
 <file path=customXml/item3.xml><?xml version="1.0" encoding="utf-8"?>
-<?mso-contentType ?>
-<FormTemplates xmlns="http://schemas.microsoft.com/sharepoint/v3/contenttype/forms">
-  <Display>DocumentLibraryForm</Display>
-  <Edit>DocumentLibraryForm</Edit>
-  <New>DocumentLibraryForm</New>
-</FormTemplates>
+<LongProperties xmlns="http://schemas.microsoft.com/office/2006/metadata/longProperties"/>
 </file>
 
 <file path=customXml/item4.xml><?xml version="1.0" encoding="utf-8"?>
@@ -2737,9 +2755,9 @@
 </file>
 
 <file path=customXml/itemProps1.xml><?xml version="1.0" encoding="utf-8"?>
-<ds:datastoreItem xmlns:ds="http://schemas.openxmlformats.org/officeDocument/2006/customXml" ds:itemID="{34ACECAE-8DDC-4218-ADDE-80828E100BF5}">
+<ds:datastoreItem xmlns:ds="http://schemas.openxmlformats.org/officeDocument/2006/customXml" ds:itemID="{47870AFC-B140-4E73-B0E2-054A74E7EB25}">
   <ds:schemaRefs>
-    <ds:schemaRef ds:uri="http://schemas.microsoft.com/office/2006/metadata/longProperties"/>
+    <ds:schemaRef ds:uri="http://schemas.microsoft.com/sharepoint/v3/contenttype/forms"/>
   </ds:schemaRefs>
 </ds:datastoreItem>
 </file>
@@ -2764,9 +2782,9 @@
 </file>
 
 <file path=customXml/itemProps3.xml><?xml version="1.0" encoding="utf-8"?>
-<ds:datastoreItem xmlns:ds="http://schemas.openxmlformats.org/officeDocument/2006/customXml" ds:itemID="{47870AFC-B140-4E73-B0E2-054A74E7EB25}">
+<ds:datastoreItem xmlns:ds="http://schemas.openxmlformats.org/officeDocument/2006/customXml" ds:itemID="{34ACECAE-8DDC-4218-ADDE-80828E100BF5}">
   <ds:schemaRefs>
-    <ds:schemaRef ds:uri="http://schemas.microsoft.com/sharepoint/v3/contenttype/forms"/>
+    <ds:schemaRef ds:uri="http://schemas.microsoft.com/office/2006/metadata/longProperties"/>
   </ds:schemaRefs>
 </ds:datastoreItem>
 </file>

</xml_diff>